<commit_message>
Added First Example Starter
</commit_message>
<xml_diff>
--- a/Rapid  Web App Dev in Spring Boot.pptx
+++ b/Rapid  Web App Dev in Spring Boot.pptx
@@ -306,7 +306,7 @@
           <a:p>
             <a:fld id="{4AAD347D-5ACD-4C99-B74B-A9C85AD731AF}" type="datetimeFigureOut">
               <a:rPr lang="en-US" dirty="0"/>
-              <a:t>12/8/2018</a:t>
+              <a:t>12/9/2018</a:t>
             </a:fld>
             <a:endParaRPr lang="en-US" dirty="0"/>
           </a:p>
@@ -576,7 +576,7 @@
           <a:p>
             <a:fld id="{4509A250-FF31-4206-8172-F9D3106AACB1}" type="datetimeFigureOut">
               <a:rPr lang="en-US" dirty="0"/>
-              <a:t>12/8/2018</a:t>
+              <a:t>12/9/2018</a:t>
             </a:fld>
             <a:endParaRPr lang="en-US" dirty="0"/>
           </a:p>
@@ -765,7 +765,7 @@
           <a:p>
             <a:fld id="{4509A250-FF31-4206-8172-F9D3106AACB1}" type="datetimeFigureOut">
               <a:rPr lang="en-US" dirty="0"/>
-              <a:t>12/8/2018</a:t>
+              <a:t>12/9/2018</a:t>
             </a:fld>
             <a:endParaRPr lang="en-US" dirty="0"/>
           </a:p>
@@ -1033,7 +1033,7 @@
           <a:p>
             <a:fld id="{4509A250-FF31-4206-8172-F9D3106AACB1}" type="datetimeFigureOut">
               <a:rPr lang="en-US" dirty="0"/>
-              <a:t>12/8/2018</a:t>
+              <a:t>12/9/2018</a:t>
             </a:fld>
             <a:endParaRPr lang="en-US" dirty="0"/>
           </a:p>
@@ -1369,7 +1369,7 @@
           <a:p>
             <a:fld id="{4509A250-FF31-4206-8172-F9D3106AACB1}" type="datetimeFigureOut">
               <a:rPr lang="en-US" dirty="0"/>
-              <a:t>12/8/2018</a:t>
+              <a:t>12/9/2018</a:t>
             </a:fld>
             <a:endParaRPr lang="en-US" dirty="0"/>
           </a:p>
@@ -1987,7 +1987,7 @@
           <a:p>
             <a:fld id="{4509A250-FF31-4206-8172-F9D3106AACB1}" type="datetimeFigureOut">
               <a:rPr lang="en-US" dirty="0"/>
-              <a:t>12/8/2018</a:t>
+              <a:t>12/9/2018</a:t>
             </a:fld>
             <a:endParaRPr lang="en-US" dirty="0"/>
           </a:p>
@@ -2842,7 +2842,7 @@
           <a:p>
             <a:fld id="{4509A250-FF31-4206-8172-F9D3106AACB1}" type="datetimeFigureOut">
               <a:rPr lang="en-US" dirty="0"/>
-              <a:t>12/8/2018</a:t>
+              <a:t>12/9/2018</a:t>
             </a:fld>
             <a:endParaRPr lang="en-US" dirty="0"/>
           </a:p>
@@ -3007,7 +3007,7 @@
           <a:p>
             <a:fld id="{4509A250-FF31-4206-8172-F9D3106AACB1}" type="datetimeFigureOut">
               <a:rPr lang="en-US" dirty="0"/>
-              <a:t>12/8/2018</a:t>
+              <a:t>12/9/2018</a:t>
             </a:fld>
             <a:endParaRPr lang="en-US" dirty="0"/>
           </a:p>
@@ -3182,7 +3182,7 @@
           <a:p>
             <a:fld id="{4509A250-FF31-4206-8172-F9D3106AACB1}" type="datetimeFigureOut">
               <a:rPr lang="en-US" dirty="0"/>
-              <a:t>12/8/2018</a:t>
+              <a:t>12/9/2018</a:t>
             </a:fld>
             <a:endParaRPr lang="en-US" dirty="0"/>
           </a:p>
@@ -3347,7 +3347,7 @@
           <a:p>
             <a:fld id="{4509A250-FF31-4206-8172-F9D3106AACB1}" type="datetimeFigureOut">
               <a:rPr lang="en-US" dirty="0"/>
-              <a:t>12/8/2018</a:t>
+              <a:t>12/9/2018</a:t>
             </a:fld>
             <a:endParaRPr lang="en-US" dirty="0"/>
           </a:p>
@@ -3589,7 +3589,7 @@
           <a:p>
             <a:fld id="{9796027F-7875-4030-9381-8BD8C4F21935}" type="datetimeFigureOut">
               <a:rPr lang="en-US" dirty="0"/>
-              <a:t>12/8/2018</a:t>
+              <a:t>12/9/2018</a:t>
             </a:fld>
             <a:endParaRPr lang="en-US" dirty="0"/>
           </a:p>
@@ -3876,7 +3876,7 @@
           <a:p>
             <a:fld id="{9796027F-7875-4030-9381-8BD8C4F21935}" type="datetimeFigureOut">
               <a:rPr lang="en-US" dirty="0"/>
-              <a:t>12/8/2018</a:t>
+              <a:t>12/9/2018</a:t>
             </a:fld>
             <a:endParaRPr lang="en-US" dirty="0"/>
           </a:p>
@@ -4315,7 +4315,7 @@
           <a:p>
             <a:fld id="{9796027F-7875-4030-9381-8BD8C4F21935}" type="datetimeFigureOut">
               <a:rPr lang="en-US" dirty="0"/>
-              <a:t>12/8/2018</a:t>
+              <a:t>12/9/2018</a:t>
             </a:fld>
             <a:endParaRPr lang="en-US" dirty="0"/>
           </a:p>
@@ -4428,7 +4428,7 @@
           <a:p>
             <a:fld id="{4509A250-FF31-4206-8172-F9D3106AACB1}" type="datetimeFigureOut">
               <a:rPr lang="en-US" dirty="0"/>
-              <a:t>12/8/2018</a:t>
+              <a:t>12/9/2018</a:t>
             </a:fld>
             <a:endParaRPr lang="en-US" dirty="0"/>
           </a:p>
@@ -4518,7 +4518,7 @@
           <a:p>
             <a:fld id="{4509A250-FF31-4206-8172-F9D3106AACB1}" type="datetimeFigureOut">
               <a:rPr lang="en-US" dirty="0"/>
-              <a:t>12/8/2018</a:t>
+              <a:t>12/9/2018</a:t>
             </a:fld>
             <a:endParaRPr lang="en-US" dirty="0"/>
           </a:p>
@@ -4792,7 +4792,7 @@
           <a:p>
             <a:fld id="{4509A250-FF31-4206-8172-F9D3106AACB1}" type="datetimeFigureOut">
               <a:rPr lang="en-US" dirty="0"/>
-              <a:t>12/8/2018</a:t>
+              <a:t>12/9/2018</a:t>
             </a:fld>
             <a:endParaRPr lang="en-US" dirty="0"/>
           </a:p>
@@ -5062,7 +5062,7 @@
           <a:p>
             <a:fld id="{4509A250-FF31-4206-8172-F9D3106AACB1}" type="datetimeFigureOut">
               <a:rPr lang="en-US" dirty="0"/>
-              <a:t>12/8/2018</a:t>
+              <a:t>12/9/2018</a:t>
             </a:fld>
             <a:endParaRPr lang="en-US" dirty="0"/>
           </a:p>
@@ -5486,7 +5486,7 @@
           <a:p>
             <a:fld id="{4AAD347D-5ACD-4C99-B74B-A9C85AD731AF}" type="datetimeFigureOut">
               <a:rPr lang="en-US" dirty="0"/>
-              <a:t>12/8/2018</a:t>
+              <a:t>12/9/2018</a:t>
             </a:fld>
             <a:endParaRPr lang="en-US" dirty="0"/>
           </a:p>
@@ -6564,7 +6564,7 @@
           <a:p>
             <a:r>
               <a:rPr lang="en-GB" dirty="0"/>
-              <a:t>Enables creation of stand alone applications</a:t>
+              <a:t>Enables rapid creation of stand alone applications</a:t>
             </a:r>
           </a:p>
           <a:p>
@@ -6583,6 +6583,12 @@
             <a:r>
               <a:rPr lang="en-GB" dirty="0"/>
               <a:t>Convention over configuration</a:t>
+            </a:r>
+          </a:p>
+          <a:p>
+            <a:r>
+              <a:rPr lang="en-GB" dirty="0"/>
+              <a:t>Opinionated view of configuration </a:t>
             </a:r>
           </a:p>
         </p:txBody>
@@ -6666,7 +6672,21 @@
           <a:bodyPr/>
           <a:lstStyle/>
           <a:p>
-            <a:endParaRPr lang="en-GB"/>
+            <a:r>
+              <a:rPr lang="en-GB" dirty="0"/>
+              <a:t>Spring </a:t>
+            </a:r>
+            <a:r>
+              <a:rPr lang="en-GB" dirty="0" err="1"/>
+              <a:t>Initializr</a:t>
+            </a:r>
+            <a:endParaRPr lang="en-GB" dirty="0"/>
+          </a:p>
+          <a:p>
+            <a:r>
+              <a:rPr lang="en-GB" dirty="0"/>
+              <a:t>REST API</a:t>
+            </a:r>
           </a:p>
         </p:txBody>
       </p:sp>
@@ -6749,7 +6769,34 @@
           <a:bodyPr/>
           <a:lstStyle/>
           <a:p>
-            <a:endParaRPr lang="en-GB"/>
+            <a:r>
+              <a:rPr lang="en-GB" dirty="0"/>
+              <a:t>H2 DB</a:t>
+            </a:r>
+          </a:p>
+          <a:p>
+            <a:r>
+              <a:rPr lang="en-GB" dirty="0"/>
+              <a:t>JDBC templates</a:t>
+            </a:r>
+          </a:p>
+          <a:p>
+            <a:r>
+              <a:rPr lang="en-GB" dirty="0"/>
+              <a:t>Spring Profiles</a:t>
+            </a:r>
+          </a:p>
+          <a:p>
+            <a:r>
+              <a:rPr lang="en-GB" dirty="0"/>
+              <a:t>Scheduling</a:t>
+            </a:r>
+          </a:p>
+          <a:p>
+            <a:r>
+              <a:rPr lang="en-GB" dirty="0"/>
+              <a:t>Actuator</a:t>
+            </a:r>
           </a:p>
         </p:txBody>
       </p:sp>
@@ -6806,7 +6853,7 @@
           <a:p>
             <a:r>
               <a:rPr lang="en-GB" dirty="0"/>
-              <a:t>Future and conclusions</a:t>
+              <a:t>Future of Spring and Spring Boot</a:t>
             </a:r>
           </a:p>
         </p:txBody>
@@ -6832,7 +6879,40 @@
           <a:bodyPr/>
           <a:lstStyle/>
           <a:p>
-            <a:endParaRPr lang="en-GB"/>
+            <a:r>
+              <a:rPr lang="en-GB" dirty="0"/>
+              <a:t>Support for next versions of Spring -&gt; currently 5.0</a:t>
+            </a:r>
+          </a:p>
+          <a:p>
+            <a:r>
+              <a:rPr lang="en-GB" dirty="0"/>
+              <a:t>“Milestone” releases e.g. 2.1.1</a:t>
+            </a:r>
+          </a:p>
+          <a:p>
+            <a:r>
+              <a:rPr lang="en-GB" dirty="0"/>
+              <a:t>Support for third-party library updates</a:t>
+            </a:r>
+          </a:p>
+          <a:p>
+            <a:r>
+              <a:rPr lang="en-GB" dirty="0"/>
+              <a:t>Increased emphasis on security and monitoring</a:t>
+            </a:r>
+          </a:p>
+          <a:p>
+            <a:r>
+              <a:rPr lang="en-GB" dirty="0"/>
+              <a:t>Cloud support</a:t>
+            </a:r>
+          </a:p>
+          <a:p>
+            <a:r>
+              <a:rPr lang="en-GB" dirty="0"/>
+              <a:t>Emphasis on microservices </a:t>
+            </a:r>
           </a:p>
         </p:txBody>
       </p:sp>

</xml_diff>